<commit_message>
Updated and Corrected Typos
</commit_message>
<xml_diff>
--- a/What is Data Science Anyway.pptx
+++ b/What is Data Science Anyway.pptx
@@ -240,7 +240,7 @@
             <a:fld id="{6E07AEEC-E59F-4304-9B6D-2BB6DD9C1964}" type="datetimeFigureOut">
               <a:rPr lang="en-US" smtClean="0"/>
               <a:pPr/>
-              <a:t>5/7/2015</a:t>
+              <a:t>5/9/2015</a:t>
             </a:fld>
             <a:endParaRPr lang="en-US"/>
           </a:p>
@@ -402,7 +402,7 @@
             <a:fld id="{CCE06C7D-CA78-4190-A21D-706D62EE2292}" type="datetimeFigureOut">
               <a:rPr lang="en-US" smtClean="0"/>
               <a:pPr/>
-              <a:t>5/7/2015</a:t>
+              <a:t>5/9/2015</a:t>
             </a:fld>
             <a:endParaRPr lang="en-US"/>
           </a:p>
@@ -798,6 +798,100 @@
           <a:p>
             <a:r>
               <a:rPr lang="en-US" dirty="0" smtClean="0"/>
+              <a:t>Goes back to knowing</a:t>
+            </a:r>
+            <a:r>
+              <a:rPr lang="en-US" baseline="0" dirty="0" smtClean="0"/>
+              <a:t> your </a:t>
+            </a:r>
+            <a:r>
+              <a:rPr lang="en-US" baseline="0" dirty="0" smtClean="0"/>
+              <a:t>audience</a:t>
+            </a:r>
+            <a:endParaRPr lang="en-US" dirty="0"/>
+          </a:p>
+        </p:txBody>
+      </p:sp>
+      <p:sp>
+        <p:nvSpPr>
+          <p:cNvPr id="4" name="Slide Number Placeholder 3"/>
+          <p:cNvSpPr>
+            <a:spLocks noGrp="1"/>
+          </p:cNvSpPr>
+          <p:nvPr>
+            <p:ph type="sldNum" sz="quarter" idx="10"/>
+          </p:nvPr>
+        </p:nvSpPr>
+        <p:spPr/>
+        <p:txBody>
+          <a:bodyPr/>
+          <a:lstStyle/>
+          <a:p>
+            <a:fld id="{0E8F3754-019C-4E72-9C49-1D2260B0FC94}" type="slidenum">
+              <a:rPr lang="en-US" smtClean="0"/>
+              <a:pPr/>
+              <a:t>37</a:t>
+            </a:fld>
+            <a:endParaRPr lang="en-US"/>
+          </a:p>
+        </p:txBody>
+      </p:sp>
+    </p:spTree>
+  </p:cSld>
+  <p:clrMapOvr>
+    <a:masterClrMapping/>
+  </p:clrMapOvr>
+</p:notes>
+</file>
+
+<file path=ppt/notesSlides/notesSlide11.xml><?xml version="1.0" encoding="utf-8"?>
+<p:notes xmlns:a="http://schemas.openxmlformats.org/drawingml/2006/main" xmlns:r="http://schemas.openxmlformats.org/officeDocument/2006/relationships" xmlns:p="http://schemas.openxmlformats.org/presentationml/2006/main">
+  <p:cSld>
+    <p:spTree>
+      <p:nvGrpSpPr>
+        <p:cNvPr id="1" name=""/>
+        <p:cNvGrpSpPr/>
+        <p:nvPr/>
+      </p:nvGrpSpPr>
+      <p:grpSpPr>
+        <a:xfrm>
+          <a:off x="0" y="0"/>
+          <a:ext cx="0" cy="0"/>
+          <a:chOff x="0" y="0"/>
+          <a:chExt cx="0" cy="0"/>
+        </a:xfrm>
+      </p:grpSpPr>
+      <p:sp>
+        <p:nvSpPr>
+          <p:cNvPr id="2" name="Slide Image Placeholder 1"/>
+          <p:cNvSpPr>
+            <a:spLocks noGrp="1" noRot="1" noChangeAspect="1"/>
+          </p:cNvSpPr>
+          <p:nvPr>
+            <p:ph type="sldImg"/>
+          </p:nvPr>
+        </p:nvSpPr>
+        <p:spPr/>
+      </p:sp>
+      <p:sp>
+        <p:nvSpPr>
+          <p:cNvPr id="3" name="Notes Placeholder 2"/>
+          <p:cNvSpPr>
+            <a:spLocks noGrp="1"/>
+          </p:cNvSpPr>
+          <p:nvPr>
+            <p:ph type="body" idx="1"/>
+          </p:nvPr>
+        </p:nvSpPr>
+        <p:spPr/>
+        <p:txBody>
+          <a:bodyPr>
+            <a:normAutofit/>
+          </a:bodyPr>
+          <a:lstStyle/>
+          <a:p>
+            <a:r>
+              <a:rPr lang="en-US" dirty="0" smtClean="0"/>
               <a:t>Other tools</a:t>
             </a:r>
           </a:p>
@@ -1151,14 +1245,6 @@
           </a:bodyPr>
           <a:lstStyle/>
           <a:p>
-            <a:r>
-              <a:rPr lang="en-US" dirty="0" smtClean="0"/>
-              <a:t>International Data </a:t>
-            </a:r>
-            <a:r>
-              <a:rPr lang="en-US" dirty="0" err="1" smtClean="0"/>
-              <a:t>Coorporation</a:t>
-            </a:r>
             <a:endParaRPr lang="en-US" dirty="0"/>
           </a:p>
         </p:txBody>
@@ -1181,7 +1267,7 @@
             <a:fld id="{0E8F3754-019C-4E72-9C49-1D2260B0FC94}" type="slidenum">
               <a:rPr lang="en-US" smtClean="0"/>
               <a:pPr/>
-              <a:t>12</a:t>
+              <a:t>9</a:t>
             </a:fld>
             <a:endParaRPr lang="en-US"/>
           </a:p>
@@ -1243,11 +1329,11 @@
           <a:p>
             <a:r>
               <a:rPr lang="en-US" dirty="0" smtClean="0"/>
-              <a:t>NiSource </a:t>
-            </a:r>
-            <a:r>
-              <a:rPr lang="en-US" baseline="0" dirty="0" err="1" smtClean="0"/>
-              <a:t>Anicdote</a:t>
+              <a:t>International </a:t>
+            </a:r>
+            <a:r>
+              <a:rPr lang="en-US" smtClean="0"/>
+              <a:t>Data Corporation</a:t>
             </a:r>
             <a:endParaRPr lang="en-US" dirty="0"/>
           </a:p>
@@ -1271,7 +1357,7 @@
             <a:fld id="{0E8F3754-019C-4E72-9C49-1D2260B0FC94}" type="slidenum">
               <a:rPr lang="en-US" smtClean="0"/>
               <a:pPr/>
-              <a:t>13</a:t>
+              <a:t>12</a:t>
             </a:fld>
             <a:endParaRPr lang="en-US"/>
           </a:p>
@@ -1327,224 +1413,18 @@
         <p:spPr/>
         <p:txBody>
           <a:bodyPr>
-            <a:normAutofit fontScale="70000" lnSpcReduction="20000"/>
+            <a:normAutofit/>
           </a:bodyPr>
           <a:lstStyle/>
           <a:p>
             <a:r>
-              <a:rPr lang="en-US" sz="1200" kern="1200" dirty="0" smtClean="0">
-                <a:solidFill>
-                  <a:schemeClr val="tx1"/>
-                </a:solidFill>
-                <a:latin typeface="+mn-lt"/>
-                <a:ea typeface="+mn-ea"/>
-                <a:cs typeface="+mn-cs"/>
-              </a:rPr>
-              <a:t>1. Imagine being able to give your doctor a list of your symptoms, and</a:t>
-            </a:r>
-          </a:p>
-          <a:p>
-            <a:r>
-              <a:rPr lang="en-US" sz="1200" kern="1200" dirty="0" smtClean="0">
-                <a:solidFill>
-                  <a:schemeClr val="tx1"/>
-                </a:solidFill>
-                <a:latin typeface="+mn-lt"/>
-                <a:ea typeface="+mn-ea"/>
-                <a:cs typeface="+mn-cs"/>
-              </a:rPr>
-              <a:t>he has access to every single medical journal produced in the last</a:t>
-            </a:r>
-          </a:p>
-          <a:p>
-            <a:r>
-              <a:rPr lang="en-US" sz="1200" kern="1200" dirty="0" smtClean="0">
-                <a:solidFill>
-                  <a:schemeClr val="tx1"/>
-                </a:solidFill>
-                <a:latin typeface="+mn-lt"/>
-                <a:ea typeface="+mn-ea"/>
-                <a:cs typeface="+mn-cs"/>
-              </a:rPr>
-              <a:t>several </a:t>
-            </a:r>
-            <a:r>
-              <a:rPr lang="en-US" sz="1200" kern="1200" dirty="0" smtClean="0">
-                <a:solidFill>
-                  <a:schemeClr val="tx1"/>
-                </a:solidFill>
-                <a:latin typeface="+mn-lt"/>
-                <a:ea typeface="+mn-ea"/>
-                <a:cs typeface="+mn-cs"/>
-              </a:rPr>
-              <a:t>decades (PDR).  </a:t>
-            </a:r>
-            <a:r>
-              <a:rPr lang="en-US" sz="1200" kern="1200" dirty="0" smtClean="0">
-                <a:solidFill>
-                  <a:schemeClr val="tx1"/>
-                </a:solidFill>
-                <a:latin typeface="+mn-lt"/>
-                <a:ea typeface="+mn-ea"/>
-                <a:cs typeface="+mn-cs"/>
-              </a:rPr>
-              <a:t>Not only that, but a system that prevents them from</a:t>
-            </a:r>
-          </a:p>
-          <a:p>
-            <a:r>
-              <a:rPr lang="en-US" sz="1200" kern="1200" dirty="0" smtClean="0">
-                <a:solidFill>
-                  <a:schemeClr val="tx1"/>
-                </a:solidFill>
-                <a:latin typeface="+mn-lt"/>
-                <a:ea typeface="+mn-ea"/>
-                <a:cs typeface="+mn-cs"/>
-              </a:rPr>
-              <a:t>determine you have Ebola, when in reality you have a cold.  The system</a:t>
-            </a:r>
-          </a:p>
-          <a:p>
-            <a:r>
-              <a:rPr lang="en-US" sz="1200" kern="1200" dirty="0" smtClean="0">
-                <a:solidFill>
-                  <a:schemeClr val="tx1"/>
-                </a:solidFill>
-                <a:latin typeface="+mn-lt"/>
-                <a:ea typeface="+mn-ea"/>
-                <a:cs typeface="+mn-cs"/>
-              </a:rPr>
-              <a:t>works based on probability, and confidence.  It is reliant on doctors to</a:t>
-            </a:r>
-          </a:p>
-          <a:p>
-            <a:r>
-              <a:rPr lang="en-US" sz="1200" kern="1200" dirty="0" smtClean="0">
-                <a:solidFill>
-                  <a:schemeClr val="tx1"/>
-                </a:solidFill>
-                <a:latin typeface="+mn-lt"/>
-                <a:ea typeface="+mn-ea"/>
-                <a:cs typeface="+mn-cs"/>
-              </a:rPr>
-              <a:t>provide feedback so that it can learn and improve its diagnostic</a:t>
-            </a:r>
-          </a:p>
-          <a:p>
-            <a:r>
-              <a:rPr lang="en-US" sz="1200" kern="1200" dirty="0" smtClean="0">
-                <a:solidFill>
-                  <a:schemeClr val="tx1"/>
-                </a:solidFill>
-                <a:latin typeface="+mn-lt"/>
-                <a:ea typeface="+mn-ea"/>
-                <a:cs typeface="+mn-cs"/>
-              </a:rPr>
-              <a:t>process beyond its original programming.    </a:t>
-            </a:r>
-          </a:p>
-          <a:p>
-            <a:endParaRPr lang="en-US" sz="1200" kern="1200" dirty="0" smtClean="0">
-              <a:solidFill>
-                <a:schemeClr val="tx1"/>
-              </a:solidFill>
-              <a:latin typeface="+mn-lt"/>
-              <a:ea typeface="+mn-ea"/>
-              <a:cs typeface="+mn-cs"/>
-            </a:endParaRPr>
-          </a:p>
-          <a:p>
-            <a:r>
-              <a:rPr lang="en-US" sz="1200" kern="1200" dirty="0" smtClean="0">
-                <a:solidFill>
-                  <a:schemeClr val="tx1"/>
-                </a:solidFill>
-                <a:latin typeface="+mn-lt"/>
-                <a:ea typeface="+mn-ea"/>
-                <a:cs typeface="+mn-cs"/>
-              </a:rPr>
-              <a:t>2. Now imagine, you go to the fridge, you have an odd assortment of</a:t>
-            </a:r>
-          </a:p>
-          <a:p>
-            <a:r>
-              <a:rPr lang="en-US" sz="1200" kern="1200" dirty="0" smtClean="0">
-                <a:solidFill>
-                  <a:schemeClr val="tx1"/>
-                </a:solidFill>
-                <a:latin typeface="+mn-lt"/>
-                <a:ea typeface="+mn-ea"/>
-                <a:cs typeface="+mn-cs"/>
-              </a:rPr>
-              <a:t>ingredients, and no clue what to do with them.  As a proof of concept </a:t>
-            </a:r>
-          </a:p>
-          <a:p>
-            <a:r>
-              <a:rPr lang="en-US" sz="1200" kern="1200" dirty="0" smtClean="0">
-                <a:solidFill>
-                  <a:schemeClr val="tx1"/>
-                </a:solidFill>
-                <a:latin typeface="+mn-lt"/>
-                <a:ea typeface="+mn-ea"/>
-                <a:cs typeface="+mn-cs"/>
-              </a:rPr>
-              <a:t>(Post Jeopardy) a Watson system was loaded full of nearly 100 years </a:t>
-            </a:r>
-          </a:p>
-          <a:p>
-            <a:r>
-              <a:rPr lang="en-US" sz="1200" kern="1200" dirty="0" smtClean="0">
-                <a:solidFill>
-                  <a:schemeClr val="tx1"/>
-                </a:solidFill>
-                <a:latin typeface="+mn-lt"/>
-                <a:ea typeface="+mn-ea"/>
-                <a:cs typeface="+mn-cs"/>
-              </a:rPr>
-              <a:t>of recipe data, and can accept new recopies from users at any time. </a:t>
-            </a:r>
-          </a:p>
-          <a:p>
-            <a:r>
-              <a:rPr lang="en-US" sz="1200" kern="1200" dirty="0" smtClean="0">
-                <a:solidFill>
-                  <a:schemeClr val="tx1"/>
-                </a:solidFill>
-                <a:latin typeface="+mn-lt"/>
-                <a:ea typeface="+mn-ea"/>
-                <a:cs typeface="+mn-cs"/>
-              </a:rPr>
-              <a:t>It also has in its DB listings of ingredients that are similar to each</a:t>
-            </a:r>
-          </a:p>
-          <a:p>
-            <a:r>
-              <a:rPr lang="en-US" sz="1200" kern="1200" dirty="0" smtClean="0">
-                <a:solidFill>
-                  <a:schemeClr val="tx1"/>
-                </a:solidFill>
-                <a:latin typeface="+mn-lt"/>
-                <a:ea typeface="+mn-ea"/>
-                <a:cs typeface="+mn-cs"/>
-              </a:rPr>
-              <a:t>other so that recopies can be modified to account for what you are</a:t>
-            </a:r>
-          </a:p>
-          <a:p>
-            <a:r>
-              <a:rPr lang="en-US" sz="1200" kern="1200" dirty="0" smtClean="0">
-                <a:solidFill>
-                  <a:schemeClr val="tx1"/>
-                </a:solidFill>
-                <a:latin typeface="+mn-lt"/>
-                <a:ea typeface="+mn-ea"/>
-                <a:cs typeface="+mn-cs"/>
-              </a:rPr>
-              <a:t>missing, or extra ingredients that you have in your supplies.  </a:t>
-            </a:r>
-          </a:p>
-          <a:p>
+              <a:rPr lang="en-US" dirty="0" smtClean="0"/>
+              <a:t>NiSource </a:t>
+            </a:r>
+            <a:r>
+              <a:rPr lang="en-US" baseline="0" dirty="0" err="1" smtClean="0"/>
+              <a:t>Anicdote</a:t>
+            </a:r>
             <a:endParaRPr lang="en-US" dirty="0"/>
           </a:p>
         </p:txBody>
@@ -1567,7 +1447,7 @@
             <a:fld id="{0E8F3754-019C-4E72-9C49-1D2260B0FC94}" type="slidenum">
               <a:rPr lang="en-US" smtClean="0"/>
               <a:pPr/>
-              <a:t>20</a:t>
+              <a:t>13</a:t>
             </a:fld>
             <a:endParaRPr lang="en-US"/>
           </a:p>
@@ -1623,17 +1503,199 @@
         <p:spPr/>
         <p:txBody>
           <a:bodyPr>
-            <a:normAutofit/>
+            <a:normAutofit fontScale="70000" lnSpcReduction="20000"/>
           </a:bodyPr>
           <a:lstStyle/>
           <a:p>
             <a:r>
-              <a:rPr lang="en-US" dirty="0" smtClean="0"/>
-              <a:t>Client</a:t>
-            </a:r>
-            <a:r>
-              <a:rPr lang="en-US" baseline="0" dirty="0" smtClean="0"/>
-              <a:t> story</a:t>
+              <a:rPr lang="en-US" sz="1200" kern="1200" dirty="0" smtClean="0">
+                <a:solidFill>
+                  <a:schemeClr val="tx1"/>
+                </a:solidFill>
+                <a:latin typeface="+mn-lt"/>
+                <a:ea typeface="+mn-ea"/>
+                <a:cs typeface="+mn-cs"/>
+              </a:rPr>
+              <a:t>1. Imagine being able to give your doctor a list of your symptoms, and</a:t>
+            </a:r>
+          </a:p>
+          <a:p>
+            <a:r>
+              <a:rPr lang="en-US" sz="1200" kern="1200" dirty="0" smtClean="0">
+                <a:solidFill>
+                  <a:schemeClr val="tx1"/>
+                </a:solidFill>
+                <a:latin typeface="+mn-lt"/>
+                <a:ea typeface="+mn-ea"/>
+                <a:cs typeface="+mn-cs"/>
+              </a:rPr>
+              <a:t>he has access to every single medical journal produced in the last</a:t>
+            </a:r>
+          </a:p>
+          <a:p>
+            <a:r>
+              <a:rPr lang="en-US" sz="1200" kern="1200" dirty="0" smtClean="0">
+                <a:solidFill>
+                  <a:schemeClr val="tx1"/>
+                </a:solidFill>
+                <a:latin typeface="+mn-lt"/>
+                <a:ea typeface="+mn-ea"/>
+                <a:cs typeface="+mn-cs"/>
+              </a:rPr>
+              <a:t>several decades (PDR).  Not only that, but a system that prevents them from</a:t>
+            </a:r>
+          </a:p>
+          <a:p>
+            <a:r>
+              <a:rPr lang="en-US" sz="1200" kern="1200" dirty="0" smtClean="0">
+                <a:solidFill>
+                  <a:schemeClr val="tx1"/>
+                </a:solidFill>
+                <a:latin typeface="+mn-lt"/>
+                <a:ea typeface="+mn-ea"/>
+                <a:cs typeface="+mn-cs"/>
+              </a:rPr>
+              <a:t>determine you have Ebola, when in reality you have a cold.  The system</a:t>
+            </a:r>
+          </a:p>
+          <a:p>
+            <a:r>
+              <a:rPr lang="en-US" sz="1200" kern="1200" dirty="0" smtClean="0">
+                <a:solidFill>
+                  <a:schemeClr val="tx1"/>
+                </a:solidFill>
+                <a:latin typeface="+mn-lt"/>
+                <a:ea typeface="+mn-ea"/>
+                <a:cs typeface="+mn-cs"/>
+              </a:rPr>
+              <a:t>works based on probability, and confidence.  It is reliant on doctors to</a:t>
+            </a:r>
+          </a:p>
+          <a:p>
+            <a:r>
+              <a:rPr lang="en-US" sz="1200" kern="1200" dirty="0" smtClean="0">
+                <a:solidFill>
+                  <a:schemeClr val="tx1"/>
+                </a:solidFill>
+                <a:latin typeface="+mn-lt"/>
+                <a:ea typeface="+mn-ea"/>
+                <a:cs typeface="+mn-cs"/>
+              </a:rPr>
+              <a:t>provide feedback so that it can learn and improve its diagnostic</a:t>
+            </a:r>
+          </a:p>
+          <a:p>
+            <a:r>
+              <a:rPr lang="en-US" sz="1200" kern="1200" dirty="0" smtClean="0">
+                <a:solidFill>
+                  <a:schemeClr val="tx1"/>
+                </a:solidFill>
+                <a:latin typeface="+mn-lt"/>
+                <a:ea typeface="+mn-ea"/>
+                <a:cs typeface="+mn-cs"/>
+              </a:rPr>
+              <a:t>process beyond its original programming.    </a:t>
+            </a:r>
+          </a:p>
+          <a:p>
+            <a:endParaRPr lang="en-US" sz="1200" kern="1200" dirty="0" smtClean="0">
+              <a:solidFill>
+                <a:schemeClr val="tx1"/>
+              </a:solidFill>
+              <a:latin typeface="+mn-lt"/>
+              <a:ea typeface="+mn-ea"/>
+              <a:cs typeface="+mn-cs"/>
+            </a:endParaRPr>
+          </a:p>
+          <a:p>
+            <a:r>
+              <a:rPr lang="en-US" sz="1200" kern="1200" dirty="0" smtClean="0">
+                <a:solidFill>
+                  <a:schemeClr val="tx1"/>
+                </a:solidFill>
+                <a:latin typeface="+mn-lt"/>
+                <a:ea typeface="+mn-ea"/>
+                <a:cs typeface="+mn-cs"/>
+              </a:rPr>
+              <a:t>2. Now imagine, you go to the fridge, you have an odd assortment of</a:t>
+            </a:r>
+          </a:p>
+          <a:p>
+            <a:r>
+              <a:rPr lang="en-US" sz="1200" kern="1200" dirty="0" smtClean="0">
+                <a:solidFill>
+                  <a:schemeClr val="tx1"/>
+                </a:solidFill>
+                <a:latin typeface="+mn-lt"/>
+                <a:ea typeface="+mn-ea"/>
+                <a:cs typeface="+mn-cs"/>
+              </a:rPr>
+              <a:t>ingredients, and no clue what to do with them.  As a proof of concept </a:t>
+            </a:r>
+          </a:p>
+          <a:p>
+            <a:r>
+              <a:rPr lang="en-US" sz="1200" kern="1200" dirty="0" smtClean="0">
+                <a:solidFill>
+                  <a:schemeClr val="tx1"/>
+                </a:solidFill>
+                <a:latin typeface="+mn-lt"/>
+                <a:ea typeface="+mn-ea"/>
+                <a:cs typeface="+mn-cs"/>
+              </a:rPr>
+              <a:t>(Post Jeopardy) a Watson system was loaded full of nearly 100 years </a:t>
+            </a:r>
+          </a:p>
+          <a:p>
+            <a:r>
+              <a:rPr lang="en-US" sz="1200" kern="1200" dirty="0" smtClean="0">
+                <a:solidFill>
+                  <a:schemeClr val="tx1"/>
+                </a:solidFill>
+                <a:latin typeface="+mn-lt"/>
+                <a:ea typeface="+mn-ea"/>
+                <a:cs typeface="+mn-cs"/>
+              </a:rPr>
+              <a:t>of recipe data, and can accept new recopies from users at any time. </a:t>
+            </a:r>
+          </a:p>
+          <a:p>
+            <a:r>
+              <a:rPr lang="en-US" sz="1200" kern="1200" dirty="0" smtClean="0">
+                <a:solidFill>
+                  <a:schemeClr val="tx1"/>
+                </a:solidFill>
+                <a:latin typeface="+mn-lt"/>
+                <a:ea typeface="+mn-ea"/>
+                <a:cs typeface="+mn-cs"/>
+              </a:rPr>
+              <a:t>It also has in its DB listings of ingredients that are similar to each</a:t>
+            </a:r>
+          </a:p>
+          <a:p>
+            <a:r>
+              <a:rPr lang="en-US" sz="1200" kern="1200" dirty="0" smtClean="0">
+                <a:solidFill>
+                  <a:schemeClr val="tx1"/>
+                </a:solidFill>
+                <a:latin typeface="+mn-lt"/>
+                <a:ea typeface="+mn-ea"/>
+                <a:cs typeface="+mn-cs"/>
+              </a:rPr>
+              <a:t>other so that recopies can be modified to account for what you are</a:t>
+            </a:r>
+          </a:p>
+          <a:p>
+            <a:r>
+              <a:rPr lang="en-US" sz="1200" kern="1200" dirty="0" smtClean="0">
+                <a:solidFill>
+                  <a:schemeClr val="tx1"/>
+                </a:solidFill>
+                <a:latin typeface="+mn-lt"/>
+                <a:ea typeface="+mn-ea"/>
+                <a:cs typeface="+mn-cs"/>
+              </a:rPr>
+              <a:t>missing, or extra ingredients that you have in your supplies.  </a:t>
             </a:r>
           </a:p>
           <a:p>
@@ -1659,7 +1721,7 @@
             <a:fld id="{0E8F3754-019C-4E72-9C49-1D2260B0FC94}" type="slidenum">
               <a:rPr lang="en-US" smtClean="0"/>
               <a:pPr/>
-              <a:t>33</a:t>
+              <a:t>20</a:t>
             </a:fld>
             <a:endParaRPr lang="en-US"/>
           </a:p>
@@ -1721,16 +1783,14 @@
           <a:p>
             <a:r>
               <a:rPr lang="en-US" dirty="0" smtClean="0"/>
-              <a:t>Goes back to knowing</a:t>
+              <a:t>Client</a:t>
             </a:r>
             <a:r>
               <a:rPr lang="en-US" baseline="0" dirty="0" smtClean="0"/>
-              <a:t> your </a:t>
-            </a:r>
-            <a:r>
-              <a:rPr lang="en-US" baseline="0" dirty="0" err="1" smtClean="0"/>
-              <a:t>audiance</a:t>
-            </a:r>
+              <a:t> story</a:t>
+            </a:r>
+          </a:p>
+          <a:p>
             <a:endParaRPr lang="en-US" dirty="0"/>
           </a:p>
         </p:txBody>
@@ -1753,7 +1813,7 @@
             <a:fld id="{0E8F3754-019C-4E72-9C49-1D2260B0FC94}" type="slidenum">
               <a:rPr lang="en-US" smtClean="0"/>
               <a:pPr/>
-              <a:t>37</a:t>
+              <a:t>33</a:t>
             </a:fld>
             <a:endParaRPr lang="en-US"/>
           </a:p>
@@ -1955,7 +2015,7 @@
             <a:fld id="{DCBBC5C3-FE11-4486-BBFB-24AAD5A14C24}" type="datetime1">
               <a:rPr lang="en-US" smtClean="0"/>
               <a:pPr/>
-              <a:t>5/7/2015</a:t>
+              <a:t>5/9/2015</a:t>
             </a:fld>
             <a:endParaRPr lang="en-US"/>
           </a:p>
@@ -2172,7 +2232,7 @@
             <a:fld id="{4E850697-D67B-4260-A310-370AB6503D0F}" type="datetime1">
               <a:rPr lang="en-US" smtClean="0"/>
               <a:pPr/>
-              <a:t>5/7/2015</a:t>
+              <a:t>5/9/2015</a:t>
             </a:fld>
             <a:endParaRPr lang="en-US"/>
           </a:p>
@@ -2353,7 +2413,7 @@
             <a:fld id="{E0BB54E5-E8CC-4190-AA59-97C7174D90A1}" type="datetime1">
               <a:rPr lang="en-US" smtClean="0"/>
               <a:pPr/>
-              <a:t>5/7/2015</a:t>
+              <a:t>5/9/2015</a:t>
             </a:fld>
             <a:endParaRPr lang="en-US"/>
           </a:p>
@@ -2568,7 +2628,7 @@
             <a:fld id="{1D7CC26E-E861-4AAA-BE9D-F6A9F75E5A14}" type="datetime1">
               <a:rPr lang="en-US" smtClean="0"/>
               <a:pPr/>
-              <a:t>5/7/2015</a:t>
+              <a:t>5/9/2015</a:t>
             </a:fld>
             <a:endParaRPr lang="en-US"/>
           </a:p>
@@ -2815,7 +2875,7 @@
             <a:fld id="{DC4CCF05-80E0-476C-8471-1CBF2A4D11B5}" type="datetime1">
               <a:rPr lang="en-US" smtClean="0"/>
               <a:pPr/>
-              <a:t>5/7/2015</a:t>
+              <a:t>5/9/2015</a:t>
             </a:fld>
             <a:endParaRPr lang="en-US"/>
           </a:p>
@@ -3104,7 +3164,7 @@
             <a:fld id="{81D8AEA5-9EF8-4897-A89F-7197AD5DAEA9}" type="datetime1">
               <a:rPr lang="en-US" smtClean="0"/>
               <a:pPr/>
-              <a:t>5/7/2015</a:t>
+              <a:t>5/9/2015</a:t>
             </a:fld>
             <a:endParaRPr lang="en-US"/>
           </a:p>
@@ -3527,7 +3587,7 @@
             <a:fld id="{F9A92D26-5654-4068-8396-622287F66E32}" type="datetime1">
               <a:rPr lang="en-US" smtClean="0"/>
               <a:pPr/>
-              <a:t>5/7/2015</a:t>
+              <a:t>5/9/2015</a:t>
             </a:fld>
             <a:endParaRPr lang="en-US"/>
           </a:p>
@@ -3646,7 +3706,7 @@
             <a:fld id="{86EEDD30-A248-42DF-A339-6791F6BEFA78}" type="datetime1">
               <a:rPr lang="en-US" smtClean="0"/>
               <a:pPr/>
-              <a:t>5/7/2015</a:t>
+              <a:t>5/9/2015</a:t>
             </a:fld>
             <a:endParaRPr lang="en-US"/>
           </a:p>
@@ -3742,7 +3802,7 @@
             <a:fld id="{01BF93A4-1696-41E5-AE4E-B34DEB0BECB7}" type="datetime1">
               <a:rPr lang="en-US" smtClean="0"/>
               <a:pPr/>
-              <a:t>5/7/2015</a:t>
+              <a:t>5/9/2015</a:t>
             </a:fld>
             <a:endParaRPr lang="en-US"/>
           </a:p>
@@ -4020,7 +4080,7 @@
             <a:fld id="{61859465-16B9-4BE3-8419-2583A866D4DB}" type="datetime1">
               <a:rPr lang="en-US" smtClean="0"/>
               <a:pPr/>
-              <a:t>5/7/2015</a:t>
+              <a:t>5/9/2015</a:t>
             </a:fld>
             <a:endParaRPr lang="en-US"/>
           </a:p>
@@ -4278,7 +4338,7 @@
             <a:fld id="{8AB3F790-494B-4974-90E7-A8F9415048AF}" type="datetime1">
               <a:rPr lang="en-US" smtClean="0"/>
               <a:pPr/>
-              <a:t>5/7/2015</a:t>
+              <a:t>5/9/2015</a:t>
             </a:fld>
             <a:endParaRPr lang="en-US"/>
           </a:p>
@@ -4516,7 +4576,7 @@
             <a:fld id="{FB01C892-DECB-4303-A8C5-73905A408ACA}" type="datetime1">
               <a:rPr lang="en-US" smtClean="0"/>
               <a:pPr/>
-              <a:t>5/7/2015</a:t>
+              <a:t>5/9/2015</a:t>
             </a:fld>
             <a:endParaRPr lang="en-US" dirty="0"/>
           </a:p>
@@ -5179,7 +5239,7 @@
             <a:fld id="{81D8AEA5-9EF8-4897-A89F-7197AD5DAEA9}" type="datetime1">
               <a:rPr lang="en-US" smtClean="0"/>
               <a:pPr/>
-              <a:t>5/7/2015</a:t>
+              <a:t>5/9/2015</a:t>
             </a:fld>
             <a:endParaRPr lang="en-US"/>
           </a:p>
@@ -5292,7 +5352,7 @@
             <a:fld id="{81D8AEA5-9EF8-4897-A89F-7197AD5DAEA9}" type="datetime1">
               <a:rPr lang="en-US" smtClean="0"/>
               <a:pPr/>
-              <a:t>5/7/2015</a:t>
+              <a:t>5/9/2015</a:t>
             </a:fld>
             <a:endParaRPr lang="en-US"/>
           </a:p>
@@ -5441,7 +5501,7 @@
             <a:fld id="{81D8AEA5-9EF8-4897-A89F-7197AD5DAEA9}" type="datetime1">
               <a:rPr lang="en-US" smtClean="0"/>
               <a:pPr/>
-              <a:t>5/7/2015</a:t>
+              <a:t>5/9/2015</a:t>
             </a:fld>
             <a:endParaRPr lang="en-US"/>
           </a:p>
@@ -5612,7 +5672,7 @@
             <a:fld id="{81D8AEA5-9EF8-4897-A89F-7197AD5DAEA9}" type="datetime1">
               <a:rPr lang="en-US" smtClean="0"/>
               <a:pPr/>
-              <a:t>5/7/2015</a:t>
+              <a:t>5/9/2015</a:t>
             </a:fld>
             <a:endParaRPr lang="en-US"/>
           </a:p>
@@ -5768,7 +5828,7 @@
             <a:fld id="{F9A92D26-5654-4068-8396-622287F66E32}" type="datetime1">
               <a:rPr lang="en-US" smtClean="0"/>
               <a:pPr/>
-              <a:t>5/7/2015</a:t>
+              <a:t>5/9/2015</a:t>
             </a:fld>
             <a:endParaRPr lang="en-US"/>
           </a:p>
@@ -5881,7 +5941,7 @@
             <a:fld id="{81D8AEA5-9EF8-4897-A89F-7197AD5DAEA9}" type="datetime1">
               <a:rPr lang="en-US" smtClean="0"/>
               <a:pPr/>
-              <a:t>5/7/2015</a:t>
+              <a:t>5/9/2015</a:t>
             </a:fld>
             <a:endParaRPr lang="en-US"/>
           </a:p>
@@ -6037,7 +6097,7 @@
             <a:fld id="{81D8AEA5-9EF8-4897-A89F-7197AD5DAEA9}" type="datetime1">
               <a:rPr lang="en-US" smtClean="0"/>
               <a:pPr/>
-              <a:t>5/7/2015</a:t>
+              <a:t>5/9/2015</a:t>
             </a:fld>
             <a:endParaRPr lang="en-US"/>
           </a:p>
@@ -6167,7 +6227,7 @@
             <a:fld id="{81D8AEA5-9EF8-4897-A89F-7197AD5DAEA9}" type="datetime1">
               <a:rPr lang="en-US" smtClean="0"/>
               <a:pPr/>
-              <a:t>5/7/2015</a:t>
+              <a:t>5/9/2015</a:t>
             </a:fld>
             <a:endParaRPr lang="en-US"/>
           </a:p>
@@ -6326,7 +6386,7 @@
             <a:fld id="{81D8AEA5-9EF8-4897-A89F-7197AD5DAEA9}" type="datetime1">
               <a:rPr lang="en-US" smtClean="0"/>
               <a:pPr/>
-              <a:t>5/7/2015</a:t>
+              <a:t>5/9/2015</a:t>
             </a:fld>
             <a:endParaRPr lang="en-US"/>
           </a:p>
@@ -6497,7 +6557,7 @@
             <a:fld id="{81D8AEA5-9EF8-4897-A89F-7197AD5DAEA9}" type="datetime1">
               <a:rPr lang="en-US" smtClean="0"/>
               <a:pPr/>
-              <a:t>5/7/2015</a:t>
+              <a:t>5/9/2015</a:t>
             </a:fld>
             <a:endParaRPr lang="en-US"/>
           </a:p>
@@ -6593,7 +6653,7 @@
             <a:fld id="{B4148077-6B83-43C7-9BD6-0D25154245E9}" type="datetime1">
               <a:rPr lang="en-US" smtClean="0"/>
               <a:pPr/>
-              <a:t>5/7/2015</a:t>
+              <a:t>5/9/2015</a:t>
             </a:fld>
             <a:endParaRPr lang="en-US"/>
           </a:p>
@@ -6775,7 +6835,7 @@
             <a:fld id="{81D8AEA5-9EF8-4897-A89F-7197AD5DAEA9}" type="datetime1">
               <a:rPr lang="en-US" smtClean="0"/>
               <a:pPr/>
-              <a:t>5/7/2015</a:t>
+              <a:t>5/9/2015</a:t>
             </a:fld>
             <a:endParaRPr lang="en-US"/>
           </a:p>
@@ -6895,7 +6955,7 @@
             <a:fld id="{81D8AEA5-9EF8-4897-A89F-7197AD5DAEA9}" type="datetime1">
               <a:rPr lang="en-US" smtClean="0"/>
               <a:pPr/>
-              <a:t>5/7/2015</a:t>
+              <a:t>5/9/2015</a:t>
             </a:fld>
             <a:endParaRPr lang="en-US"/>
           </a:p>
@@ -7006,7 +7066,7 @@
             <a:fld id="{81D8AEA5-9EF8-4897-A89F-7197AD5DAEA9}" type="datetime1">
               <a:rPr lang="en-US" smtClean="0"/>
               <a:pPr/>
-              <a:t>5/7/2015</a:t>
+              <a:t>5/9/2015</a:t>
             </a:fld>
             <a:endParaRPr lang="en-US"/>
           </a:p>
@@ -7092,15 +7152,7 @@
             <a:pPr lvl="1"/>
             <a:r>
               <a:rPr lang="en-US" dirty="0" smtClean="0"/>
-              <a:t>They most likely do not care about all of the small </a:t>
-            </a:r>
-            <a:r>
-              <a:rPr lang="en-US" dirty="0" smtClean="0"/>
-              <a:t>details </a:t>
-            </a:r>
-            <a:r>
-              <a:rPr lang="en-US" dirty="0" smtClean="0"/>
-              <a:t>of the average workers day </a:t>
+              <a:t>They most likely do not care about all of the small details of the average workers day </a:t>
             </a:r>
           </a:p>
           <a:p>
@@ -7138,7 +7190,7 @@
             <a:fld id="{81D8AEA5-9EF8-4897-A89F-7197AD5DAEA9}" type="datetime1">
               <a:rPr lang="en-US" smtClean="0"/>
               <a:pPr/>
-              <a:t>5/7/2015</a:t>
+              <a:t>5/9/2015</a:t>
             </a:fld>
             <a:endParaRPr lang="en-US"/>
           </a:p>
@@ -7264,7 +7316,7 @@
             <a:fld id="{81D8AEA5-9EF8-4897-A89F-7197AD5DAEA9}" type="datetime1">
               <a:rPr lang="en-US" smtClean="0"/>
               <a:pPr/>
-              <a:t>5/7/2015</a:t>
+              <a:t>5/9/2015</a:t>
             </a:fld>
             <a:endParaRPr lang="en-US"/>
           </a:p>
@@ -7370,13 +7422,8 @@
           <a:p>
             <a:r>
               <a:rPr lang="en-US" dirty="0" smtClean="0"/>
-              <a:t>They need the information to make decisions relative to their position, decisions that they can </a:t>
-            </a:r>
-            <a:r>
-              <a:rPr lang="en-US" dirty="0" smtClean="0"/>
-              <a:t>make</a:t>
-            </a:r>
-            <a:endParaRPr lang="en-US" dirty="0" smtClean="0"/>
+              <a:t>They need the information to make decisions relative to their position, decisions that they can make</a:t>
+            </a:r>
           </a:p>
           <a:p>
             <a:r>
@@ -7407,7 +7454,7 @@
             <a:fld id="{81D8AEA5-9EF8-4897-A89F-7197AD5DAEA9}" type="datetime1">
               <a:rPr lang="en-US" smtClean="0"/>
               <a:pPr/>
-              <a:t>5/7/2015</a:t>
+              <a:t>5/9/2015</a:t>
             </a:fld>
             <a:endParaRPr lang="en-US"/>
           </a:p>
@@ -7509,7 +7556,7 @@
             <a:fld id="{81D8AEA5-9EF8-4897-A89F-7197AD5DAEA9}" type="datetime1">
               <a:rPr lang="en-US" smtClean="0"/>
               <a:pPr/>
-              <a:t>5/7/2015</a:t>
+              <a:t>5/9/2015</a:t>
             </a:fld>
             <a:endParaRPr lang="en-US"/>
           </a:p>
@@ -7661,7 +7708,7 @@
             <a:fld id="{81D8AEA5-9EF8-4897-A89F-7197AD5DAEA9}" type="datetime1">
               <a:rPr lang="en-US" smtClean="0"/>
               <a:pPr/>
-              <a:t>5/7/2015</a:t>
+              <a:t>5/9/2015</a:t>
             </a:fld>
             <a:endParaRPr lang="en-US"/>
           </a:p>
@@ -7784,7 +7831,7 @@
             <a:fld id="{81D8AEA5-9EF8-4897-A89F-7197AD5DAEA9}" type="datetime1">
               <a:rPr lang="en-US" smtClean="0"/>
               <a:pPr/>
-              <a:t>5/7/2015</a:t>
+              <a:t>5/9/2015</a:t>
             </a:fld>
             <a:endParaRPr lang="en-US"/>
           </a:p>
@@ -7914,7 +7961,7 @@
             <a:fld id="{81D8AEA5-9EF8-4897-A89F-7197AD5DAEA9}" type="datetime1">
               <a:rPr lang="en-US" smtClean="0"/>
               <a:pPr/>
-              <a:t>5/7/2015</a:t>
+              <a:t>5/9/2015</a:t>
             </a:fld>
             <a:endParaRPr lang="en-US"/>
           </a:p>
@@ -8033,7 +8080,7 @@
             <a:fld id="{B4148077-6B83-43C7-9BD6-0D25154245E9}" type="datetime1">
               <a:rPr lang="en-US" smtClean="0"/>
               <a:pPr/>
-              <a:t>5/7/2015</a:t>
+              <a:t>5/9/2015</a:t>
             </a:fld>
             <a:endParaRPr lang="en-US"/>
           </a:p>
@@ -8126,25 +8173,15 @@
             <a:pPr lvl="1"/>
             <a:r>
               <a:rPr lang="en-US" dirty="0" smtClean="0"/>
-              <a:t>What hypothesis do you wish to prove, or </a:t>
-            </a:r>
-            <a:r>
-              <a:rPr lang="en-US" dirty="0" smtClean="0"/>
-              <a:t>disprove? </a:t>
-            </a:r>
-            <a:endParaRPr lang="en-US" dirty="0" smtClean="0"/>
+              <a:t>What hypothesis do you wish to prove, or disprove? </a:t>
+            </a:r>
           </a:p>
           <a:p>
             <a:pPr lvl="1"/>
             <a:r>
               <a:rPr lang="en-US" dirty="0" smtClean="0"/>
-              <a:t>You need to have an understanding of what it is that you are looking to </a:t>
-            </a:r>
-            <a:r>
-              <a:rPr lang="en-US" dirty="0" smtClean="0"/>
-              <a:t>do?</a:t>
-            </a:r>
-            <a:endParaRPr lang="en-US" dirty="0" smtClean="0"/>
+              <a:t>You need to have an understanding of what it is that you are looking to do?</a:t>
+            </a:r>
           </a:p>
           <a:p>
             <a:pPr lvl="1"/>
@@ -8176,7 +8213,7 @@
             <a:fld id="{81D8AEA5-9EF8-4897-A89F-7197AD5DAEA9}" type="datetime1">
               <a:rPr lang="en-US" smtClean="0"/>
               <a:pPr/>
-              <a:t>5/7/2015</a:t>
+              <a:t>5/9/2015</a:t>
             </a:fld>
             <a:endParaRPr lang="en-US"/>
           </a:p>
@@ -8336,7 +8373,7 @@
             <a:fld id="{81D8AEA5-9EF8-4897-A89F-7197AD5DAEA9}" type="datetime1">
               <a:rPr lang="en-US" smtClean="0"/>
               <a:pPr/>
-              <a:t>5/7/2015</a:t>
+              <a:t>5/9/2015</a:t>
             </a:fld>
             <a:endParaRPr lang="en-US"/>
           </a:p>
@@ -8482,7 +8519,7 @@
             <a:fld id="{81D8AEA5-9EF8-4897-A89F-7197AD5DAEA9}" type="datetime1">
               <a:rPr lang="en-US" smtClean="0"/>
               <a:pPr/>
-              <a:t>5/7/2015</a:t>
+              <a:t>5/9/2015</a:t>
             </a:fld>
             <a:endParaRPr lang="en-US"/>
           </a:p>
@@ -8593,7 +8630,7 @@
             <a:fld id="{81D8AEA5-9EF8-4897-A89F-7197AD5DAEA9}" type="datetime1">
               <a:rPr lang="en-US" smtClean="0"/>
               <a:pPr/>
-              <a:t>5/7/2015</a:t>
+              <a:t>5/9/2015</a:t>
             </a:fld>
             <a:endParaRPr lang="en-US"/>
           </a:p>
@@ -8719,7 +8756,7 @@
             <a:fld id="{81D8AEA5-9EF8-4897-A89F-7197AD5DAEA9}" type="datetime1">
               <a:rPr lang="en-US" smtClean="0"/>
               <a:pPr/>
-              <a:t>5/7/2015</a:t>
+              <a:t>5/9/2015</a:t>
             </a:fld>
             <a:endParaRPr lang="en-US"/>
           </a:p>
@@ -8821,7 +8858,7 @@
             <a:fld id="{81D8AEA5-9EF8-4897-A89F-7197AD5DAEA9}" type="datetime1">
               <a:rPr lang="en-US" smtClean="0"/>
               <a:pPr/>
-              <a:t>5/7/2015</a:t>
+              <a:t>5/9/2015</a:t>
             </a:fld>
             <a:endParaRPr lang="en-US"/>
           </a:p>
@@ -8972,7 +9009,7 @@
             <a:fld id="{81D8AEA5-9EF8-4897-A89F-7197AD5DAEA9}" type="datetime1">
               <a:rPr lang="en-US" smtClean="0"/>
               <a:pPr/>
-              <a:t>5/7/2015</a:t>
+              <a:t>5/9/2015</a:t>
             </a:fld>
             <a:endParaRPr lang="en-US"/>
           </a:p>
@@ -9141,7 +9178,7 @@
             <a:fld id="{81D8AEA5-9EF8-4897-A89F-7197AD5DAEA9}" type="datetime1">
               <a:rPr lang="en-US" smtClean="0"/>
               <a:pPr/>
-              <a:t>5/7/2015</a:t>
+              <a:t>5/9/2015</a:t>
             </a:fld>
             <a:endParaRPr lang="en-US"/>
           </a:p>
@@ -9245,7 +9282,7 @@
             <a:fld id="{81D8AEA5-9EF8-4897-A89F-7197AD5DAEA9}" type="datetime1">
               <a:rPr lang="en-US" smtClean="0"/>
               <a:pPr/>
-              <a:t>5/7/2015</a:t>
+              <a:t>5/9/2015</a:t>
             </a:fld>
             <a:endParaRPr lang="en-US"/>
           </a:p>
@@ -9425,11 +9462,7 @@
           <a:p>
             <a:r>
               <a:rPr lang="en-US" dirty="0" smtClean="0"/>
-              <a:t>Lots of people already have </a:t>
-            </a:r>
-            <a:r>
-              <a:rPr lang="en-US" dirty="0" smtClean="0"/>
-              <a:t>experience</a:t>
+              <a:t>Lots of people already have experience</a:t>
             </a:r>
           </a:p>
           <a:p>
@@ -9437,7 +9470,6 @@
               <a:rPr lang="en-US" dirty="0" smtClean="0"/>
               <a:t>Lots of people already have the software</a:t>
             </a:r>
-            <a:endParaRPr lang="en-US" dirty="0" smtClean="0"/>
           </a:p>
           <a:p>
             <a:r>
@@ -9474,7 +9506,7 @@
             <a:fld id="{81D8AEA5-9EF8-4897-A89F-7197AD5DAEA9}" type="datetime1">
               <a:rPr lang="en-US" smtClean="0"/>
               <a:pPr/>
-              <a:t>5/7/2015</a:t>
+              <a:t>5/9/2015</a:t>
             </a:fld>
             <a:endParaRPr lang="en-US"/>
           </a:p>
@@ -9637,11 +9669,7 @@
             </a:r>
             <a:r>
               <a:rPr lang="en-US" dirty="0" smtClean="0"/>
-              <a:t> users share 3,600 new </a:t>
-            </a:r>
-            <a:r>
-              <a:rPr lang="en-US" dirty="0" smtClean="0"/>
-              <a:t>photos</a:t>
+              <a:t> users share 3,600 new photos</a:t>
             </a:r>
           </a:p>
           <a:p>
@@ -9652,11 +9680,7 @@
             </a:r>
             <a:r>
               <a:rPr lang="en-US" dirty="0" smtClean="0"/>
-              <a:t> </a:t>
-            </a:r>
-            <a:r>
-              <a:rPr lang="en-US" dirty="0" smtClean="0"/>
-              <a:t>sees 27,778 new posts published</a:t>
+              <a:t> sees 27,778 new posts published</a:t>
             </a:r>
           </a:p>
           <a:p>
@@ -9682,7 +9706,7 @@
             <a:fld id="{A435F6A1-6AA8-4998-B90C-6C59C2BAD046}" type="datetime1">
               <a:rPr lang="en-US" smtClean="0"/>
               <a:pPr/>
-              <a:t>5/7/2015</a:t>
+              <a:t>5/9/2015</a:t>
             </a:fld>
             <a:endParaRPr lang="en-US"/>
           </a:p>
@@ -9786,11 +9810,7 @@
           <a:p>
             <a:r>
               <a:rPr lang="en-US" dirty="0" smtClean="0"/>
-              <a:t>Easy </a:t>
-            </a:r>
-            <a:r>
-              <a:rPr lang="en-US" dirty="0" smtClean="0"/>
-              <a:t>to create visualizations</a:t>
+              <a:t>Easy to create visualizations</a:t>
             </a:r>
           </a:p>
           <a:p>
@@ -9844,7 +9864,7 @@
             <a:fld id="{81D8AEA5-9EF8-4897-A89F-7197AD5DAEA9}" type="datetime1">
               <a:rPr lang="en-US" smtClean="0"/>
               <a:pPr/>
-              <a:t>5/7/2015</a:t>
+              <a:t>5/9/2015</a:t>
             </a:fld>
             <a:endParaRPr lang="en-US"/>
           </a:p>
@@ -9950,13 +9970,8 @@
           <a:p>
             <a:r>
               <a:rPr lang="en-US" dirty="0" smtClean="0"/>
-              <a:t>Convenient for developers to </a:t>
-            </a:r>
-            <a:r>
-              <a:rPr lang="en-US" dirty="0" smtClean="0"/>
-              <a:t>learn if they don’t already know it</a:t>
-            </a:r>
-            <a:endParaRPr lang="en-US" dirty="0" smtClean="0"/>
+              <a:t>Convenient for developers to learn if they don’t already know it</a:t>
+            </a:r>
           </a:p>
           <a:p>
             <a:r>
@@ -9993,7 +10008,7 @@
             <a:fld id="{81D8AEA5-9EF8-4897-A89F-7197AD5DAEA9}" type="datetime1">
               <a:rPr lang="en-US" smtClean="0"/>
               <a:pPr/>
-              <a:t>5/7/2015</a:t>
+              <a:t>5/9/2015</a:t>
             </a:fld>
             <a:endParaRPr lang="en-US"/>
           </a:p>
@@ -10111,11 +10126,7 @@
           <a:p>
             <a:r>
               <a:rPr lang="en-US" dirty="0" smtClean="0"/>
-              <a:t>Must agree to have your data stored for research and development </a:t>
-            </a:r>
-            <a:r>
-              <a:rPr lang="en-US" dirty="0" smtClean="0"/>
-              <a:t>purposes</a:t>
+              <a:t>Must agree to have your data stored for research and development purposes</a:t>
             </a:r>
           </a:p>
           <a:p>
@@ -10129,7 +10140,6 @@
               <a:rPr lang="en-US" dirty="0" smtClean="0"/>
               <a:t>Produces beautiful visualizations</a:t>
             </a:r>
-            <a:endParaRPr lang="en-US" dirty="0" smtClean="0"/>
           </a:p>
           <a:p>
             <a:endParaRPr lang="en-US" dirty="0"/>
@@ -10154,7 +10164,7 @@
             <a:fld id="{81D8AEA5-9EF8-4897-A89F-7197AD5DAEA9}" type="datetime1">
               <a:rPr lang="en-US" smtClean="0"/>
               <a:pPr/>
-              <a:t>5/7/2015</a:t>
+              <a:t>5/9/2015</a:t>
             </a:fld>
             <a:endParaRPr lang="en-US"/>
           </a:p>
@@ -10268,19 +10278,7 @@
           <a:p>
             <a:r>
               <a:rPr lang="en-US" dirty="0" smtClean="0"/>
-              <a:t>Relatively </a:t>
-            </a:r>
-            <a:r>
-              <a:rPr lang="en-US" dirty="0" smtClean="0"/>
-              <a:t>e</a:t>
-            </a:r>
-            <a:r>
-              <a:rPr lang="en-US" dirty="0" smtClean="0"/>
-              <a:t>asy </a:t>
-            </a:r>
-            <a:r>
-              <a:rPr lang="en-US" dirty="0" smtClean="0"/>
-              <a:t>for developers to learn</a:t>
+              <a:t>Relatively easy for developers to learn</a:t>
             </a:r>
           </a:p>
           <a:p>
@@ -10354,7 +10352,7 @@
             <a:fld id="{81D8AEA5-9EF8-4897-A89F-7197AD5DAEA9}" type="datetime1">
               <a:rPr lang="en-US" smtClean="0"/>
               <a:pPr/>
-              <a:t>5/7/2015</a:t>
+              <a:t>5/9/2015</a:t>
             </a:fld>
             <a:endParaRPr lang="en-US"/>
           </a:p>
@@ -10498,7 +10496,7 @@
             <a:fld id="{81D8AEA5-9EF8-4897-A89F-7197AD5DAEA9}" type="datetime1">
               <a:rPr lang="en-US" smtClean="0"/>
               <a:pPr/>
-              <a:t>5/7/2015</a:t>
+              <a:t>5/9/2015</a:t>
             </a:fld>
             <a:endParaRPr lang="en-US"/>
           </a:p>
@@ -10594,7 +10592,7 @@
             <a:fld id="{81D8AEA5-9EF8-4897-A89F-7197AD5DAEA9}" type="datetime1">
               <a:rPr lang="en-US" smtClean="0"/>
               <a:pPr/>
-              <a:t>5/8/2015</a:t>
+              <a:t>5/9/2015</a:t>
             </a:fld>
             <a:endParaRPr lang="en-US"/>
           </a:p>
@@ -10755,7 +10753,7 @@
             <a:fld id="{81D8AEA5-9EF8-4897-A89F-7197AD5DAEA9}" type="datetime1">
               <a:rPr lang="en-US" smtClean="0"/>
               <a:pPr/>
-              <a:t>5/7/2015</a:t>
+              <a:t>5/9/2015</a:t>
             </a:fld>
             <a:endParaRPr lang="en-US"/>
           </a:p>
@@ -10928,7 +10926,7 @@
             <a:fld id="{81D8AEA5-9EF8-4897-A89F-7197AD5DAEA9}" type="datetime1">
               <a:rPr lang="en-US" smtClean="0"/>
               <a:pPr/>
-              <a:t>5/7/2015</a:t>
+              <a:t>5/9/2015</a:t>
             </a:fld>
             <a:endParaRPr lang="en-US"/>
           </a:p>
@@ -11095,7 +11093,7 @@
             <a:fld id="{81D8AEA5-9EF8-4897-A89F-7197AD5DAEA9}" type="datetime1">
               <a:rPr lang="en-US" smtClean="0"/>
               <a:pPr/>
-              <a:t>5/7/2015</a:t>
+              <a:t>5/9/2015</a:t>
             </a:fld>
             <a:endParaRPr lang="en-US"/>
           </a:p>
@@ -11256,7 +11254,7 @@
             <a:fld id="{81D8AEA5-9EF8-4897-A89F-7197AD5DAEA9}" type="datetime1">
               <a:rPr lang="en-US" smtClean="0"/>
               <a:pPr/>
-              <a:t>5/7/2015</a:t>
+              <a:t>5/9/2015</a:t>
             </a:fld>
             <a:endParaRPr lang="en-US"/>
           </a:p>
@@ -11395,15 +11393,7 @@
             </a:pPr>
             <a:r>
               <a:rPr lang="en-US" dirty="0" smtClean="0"/>
-              <a:t>a great diversity </a:t>
-            </a:r>
-            <a:r>
-              <a:rPr lang="en-US" dirty="0" smtClean="0"/>
-              <a:t>of knowledge, and a </a:t>
-            </a:r>
-            <a:r>
-              <a:rPr lang="en-US" dirty="0" smtClean="0"/>
-              <a:t>data scientist will</a:t>
+              <a:t>a great diversity of knowledge, and a data scientist will</a:t>
             </a:r>
           </a:p>
           <a:p>
@@ -11412,23 +11402,7 @@
             </a:pPr>
             <a:r>
               <a:rPr lang="en-US" dirty="0" smtClean="0"/>
-              <a:t>most </a:t>
-            </a:r>
-            <a:r>
-              <a:rPr lang="en-US" dirty="0" smtClean="0"/>
-              <a:t>likely be expert in only one or at </a:t>
-            </a:r>
-            <a:r>
-              <a:rPr lang="en-US" dirty="0" smtClean="0"/>
-              <a:t>most two </a:t>
-            </a:r>
-            <a:r>
-              <a:rPr lang="en-US" dirty="0" smtClean="0"/>
-              <a:t>of </a:t>
-            </a:r>
-            <a:r>
-              <a:rPr lang="en-US" dirty="0" smtClean="0"/>
-              <a:t>these</a:t>
+              <a:t>most likely be expert in only one or at most two of these</a:t>
             </a:r>
           </a:p>
           <a:p>
@@ -11437,15 +11411,7 @@
             </a:pPr>
             <a:r>
               <a:rPr lang="en-US" dirty="0" smtClean="0"/>
-              <a:t>areas </a:t>
-            </a:r>
-            <a:r>
-              <a:rPr lang="en-US" dirty="0" smtClean="0"/>
-              <a:t>and merely proficient in the other(s</a:t>
-            </a:r>
-            <a:r>
-              <a:rPr lang="en-US" dirty="0" smtClean="0"/>
-              <a:t>).</a:t>
+              <a:t>areas and merely proficient in the other(s).</a:t>
             </a:r>
           </a:p>
           <a:p>
@@ -11454,11 +11420,7 @@
             </a:pPr>
             <a:r>
               <a:rPr lang="en-US" dirty="0" smtClean="0"/>
-              <a:t>Therefore </a:t>
-            </a:r>
-            <a:r>
-              <a:rPr lang="en-US" dirty="0" smtClean="0"/>
-              <a:t>a data scientist typically works as part of a team</a:t>
+              <a:t>Therefore a data scientist typically works as part of a team</a:t>
             </a:r>
           </a:p>
           <a:p>
@@ -11502,7 +11464,7 @@
             <a:fld id="{81D8AEA5-9EF8-4897-A89F-7197AD5DAEA9}" type="datetime1">
               <a:rPr lang="en-US" smtClean="0"/>
               <a:pPr/>
-              <a:t>5/7/2015</a:t>
+              <a:t>5/9/2015</a:t>
             </a:fld>
             <a:endParaRPr lang="en-US"/>
           </a:p>

</xml_diff>